<commit_message>
add intro R workshops
</commit_message>
<xml_diff>
--- a/public/img/_hex_logo_building.pptx
+++ b/public/img/_hex_logo_building.pptx
@@ -6,8 +6,9 @@
   </p:sldMasterIdLst>
   <p:sldIdLst>
     <p:sldId id="256" r:id="rId2"/>
-    <p:sldId id="257" r:id="rId3"/>
-    <p:sldId id="258" r:id="rId4"/>
+    <p:sldId id="259" r:id="rId3"/>
+    <p:sldId id="257" r:id="rId4"/>
+    <p:sldId id="258" r:id="rId5"/>
   </p:sldIdLst>
   <p:sldSz cx="12192000" cy="6858000"/>
   <p:notesSz cx="6858000" cy="9144000"/>
@@ -156,10 +157,9 @@
           </a:lstStyle>
           <a:p>
             <a:r>
-              <a:rPr lang="en-US" smtClean="0"/>
+              <a:rPr lang="en-US"/>
               <a:t>Click to edit Master title style</a:t>
             </a:r>
-            <a:endParaRPr lang="en-US"/>
           </a:p>
         </p:txBody>
       </p:sp>
@@ -221,10 +221,9 @@
           </a:lstStyle>
           <a:p>
             <a:r>
-              <a:rPr lang="en-US" smtClean="0"/>
+              <a:rPr lang="en-US"/>
               <a:t>Click to edit Master subtitle style</a:t>
             </a:r>
-            <a:endParaRPr lang="en-US"/>
           </a:p>
         </p:txBody>
       </p:sp>
@@ -245,7 +244,7 @@
           <a:p>
             <a:fld id="{4043B791-FEDF-4108-A8EF-D59F31ED55B2}" type="datetimeFigureOut">
               <a:rPr lang="en-US" smtClean="0"/>
-              <a:t>1/23/2020</a:t>
+              <a:t>9/4/2024</a:t>
             </a:fld>
             <a:endParaRPr lang="en-US"/>
           </a:p>
@@ -339,10 +338,9 @@
           <a:lstStyle/>
           <a:p>
             <a:r>
-              <a:rPr lang="en-US" smtClean="0"/>
+              <a:rPr lang="en-US"/>
               <a:t>Click to edit Master title style</a:t>
             </a:r>
-            <a:endParaRPr lang="en-US"/>
           </a:p>
         </p:txBody>
       </p:sp>
@@ -363,38 +361,37 @@
           <a:p>
             <a:pPr lvl="0"/>
             <a:r>
-              <a:rPr lang="en-US" smtClean="0"/>
+              <a:rPr lang="en-US"/>
               <a:t>Edit Master text styles</a:t>
             </a:r>
           </a:p>
           <a:p>
             <a:pPr lvl="1"/>
             <a:r>
-              <a:rPr lang="en-US" smtClean="0"/>
+              <a:rPr lang="en-US"/>
               <a:t>Second level</a:t>
             </a:r>
           </a:p>
           <a:p>
             <a:pPr lvl="2"/>
             <a:r>
-              <a:rPr lang="en-US" smtClean="0"/>
+              <a:rPr lang="en-US"/>
               <a:t>Third level</a:t>
             </a:r>
           </a:p>
           <a:p>
             <a:pPr lvl="3"/>
             <a:r>
-              <a:rPr lang="en-US" smtClean="0"/>
+              <a:rPr lang="en-US"/>
               <a:t>Fourth level</a:t>
             </a:r>
           </a:p>
           <a:p>
             <a:pPr lvl="4"/>
             <a:r>
-              <a:rPr lang="en-US" smtClean="0"/>
+              <a:rPr lang="en-US"/>
               <a:t>Fifth level</a:t>
             </a:r>
-            <a:endParaRPr lang="en-US"/>
           </a:p>
         </p:txBody>
       </p:sp>
@@ -415,7 +412,7 @@
           <a:p>
             <a:fld id="{4043B791-FEDF-4108-A8EF-D59F31ED55B2}" type="datetimeFigureOut">
               <a:rPr lang="en-US" smtClean="0"/>
-              <a:t>1/23/2020</a:t>
+              <a:t>9/4/2024</a:t>
             </a:fld>
             <a:endParaRPr lang="en-US"/>
           </a:p>
@@ -514,10 +511,9 @@
           <a:lstStyle/>
           <a:p>
             <a:r>
-              <a:rPr lang="en-US" smtClean="0"/>
+              <a:rPr lang="en-US"/>
               <a:t>Click to edit Master title style</a:t>
             </a:r>
-            <a:endParaRPr lang="en-US"/>
           </a:p>
         </p:txBody>
       </p:sp>
@@ -543,38 +539,37 @@
           <a:p>
             <a:pPr lvl="0"/>
             <a:r>
-              <a:rPr lang="en-US" smtClean="0"/>
+              <a:rPr lang="en-US"/>
               <a:t>Edit Master text styles</a:t>
             </a:r>
           </a:p>
           <a:p>
             <a:pPr lvl="1"/>
             <a:r>
-              <a:rPr lang="en-US" smtClean="0"/>
+              <a:rPr lang="en-US"/>
               <a:t>Second level</a:t>
             </a:r>
           </a:p>
           <a:p>
             <a:pPr lvl="2"/>
             <a:r>
-              <a:rPr lang="en-US" smtClean="0"/>
+              <a:rPr lang="en-US"/>
               <a:t>Third level</a:t>
             </a:r>
           </a:p>
           <a:p>
             <a:pPr lvl="3"/>
             <a:r>
-              <a:rPr lang="en-US" smtClean="0"/>
+              <a:rPr lang="en-US"/>
               <a:t>Fourth level</a:t>
             </a:r>
           </a:p>
           <a:p>
             <a:pPr lvl="4"/>
             <a:r>
-              <a:rPr lang="en-US" smtClean="0"/>
+              <a:rPr lang="en-US"/>
               <a:t>Fifth level</a:t>
             </a:r>
-            <a:endParaRPr lang="en-US"/>
           </a:p>
         </p:txBody>
       </p:sp>
@@ -595,7 +590,7 @@
           <a:p>
             <a:fld id="{4043B791-FEDF-4108-A8EF-D59F31ED55B2}" type="datetimeFigureOut">
               <a:rPr lang="en-US" smtClean="0"/>
-              <a:t>1/23/2020</a:t>
+              <a:t>9/4/2024</a:t>
             </a:fld>
             <a:endParaRPr lang="en-US"/>
           </a:p>
@@ -689,10 +684,9 @@
           <a:lstStyle/>
           <a:p>
             <a:r>
-              <a:rPr lang="en-US" smtClean="0"/>
+              <a:rPr lang="en-US"/>
               <a:t>Click to edit Master title style</a:t>
             </a:r>
-            <a:endParaRPr lang="en-US"/>
           </a:p>
         </p:txBody>
       </p:sp>
@@ -713,38 +707,37 @@
           <a:p>
             <a:pPr lvl="0"/>
             <a:r>
-              <a:rPr lang="en-US" smtClean="0"/>
+              <a:rPr lang="en-US"/>
               <a:t>Edit Master text styles</a:t>
             </a:r>
           </a:p>
           <a:p>
             <a:pPr lvl="1"/>
             <a:r>
-              <a:rPr lang="en-US" smtClean="0"/>
+              <a:rPr lang="en-US"/>
               <a:t>Second level</a:t>
             </a:r>
           </a:p>
           <a:p>
             <a:pPr lvl="2"/>
             <a:r>
-              <a:rPr lang="en-US" smtClean="0"/>
+              <a:rPr lang="en-US"/>
               <a:t>Third level</a:t>
             </a:r>
           </a:p>
           <a:p>
             <a:pPr lvl="3"/>
             <a:r>
-              <a:rPr lang="en-US" smtClean="0"/>
+              <a:rPr lang="en-US"/>
               <a:t>Fourth level</a:t>
             </a:r>
           </a:p>
           <a:p>
             <a:pPr lvl="4"/>
             <a:r>
-              <a:rPr lang="en-US" smtClean="0"/>
+              <a:rPr lang="en-US"/>
               <a:t>Fifth level</a:t>
             </a:r>
-            <a:endParaRPr lang="en-US"/>
           </a:p>
         </p:txBody>
       </p:sp>
@@ -765,7 +758,7 @@
           <a:p>
             <a:fld id="{4043B791-FEDF-4108-A8EF-D59F31ED55B2}" type="datetimeFigureOut">
               <a:rPr lang="en-US" smtClean="0"/>
-              <a:t>1/23/2020</a:t>
+              <a:t>9/4/2024</a:t>
             </a:fld>
             <a:endParaRPr lang="en-US"/>
           </a:p>
@@ -868,10 +861,9 @@
           </a:lstStyle>
           <a:p>
             <a:r>
-              <a:rPr lang="en-US" smtClean="0"/>
+              <a:rPr lang="en-US"/>
               <a:t>Click to edit Master title style</a:t>
             </a:r>
-            <a:endParaRPr lang="en-US"/>
           </a:p>
         </p:txBody>
       </p:sp>
@@ -988,7 +980,7 @@
           <a:p>
             <a:pPr lvl="0"/>
             <a:r>
-              <a:rPr lang="en-US" smtClean="0"/>
+              <a:rPr lang="en-US"/>
               <a:t>Edit Master text styles</a:t>
             </a:r>
           </a:p>
@@ -1011,7 +1003,7 @@
           <a:p>
             <a:fld id="{4043B791-FEDF-4108-A8EF-D59F31ED55B2}" type="datetimeFigureOut">
               <a:rPr lang="en-US" smtClean="0"/>
-              <a:t>1/23/2020</a:t>
+              <a:t>9/4/2024</a:t>
             </a:fld>
             <a:endParaRPr lang="en-US"/>
           </a:p>
@@ -1105,10 +1097,9 @@
           <a:lstStyle/>
           <a:p>
             <a:r>
-              <a:rPr lang="en-US" smtClean="0"/>
+              <a:rPr lang="en-US"/>
               <a:t>Click to edit Master title style</a:t>
             </a:r>
-            <a:endParaRPr lang="en-US"/>
           </a:p>
         </p:txBody>
       </p:sp>
@@ -1134,38 +1125,37 @@
           <a:p>
             <a:pPr lvl="0"/>
             <a:r>
-              <a:rPr lang="en-US" smtClean="0"/>
+              <a:rPr lang="en-US"/>
               <a:t>Edit Master text styles</a:t>
             </a:r>
           </a:p>
           <a:p>
             <a:pPr lvl="1"/>
             <a:r>
-              <a:rPr lang="en-US" smtClean="0"/>
+              <a:rPr lang="en-US"/>
               <a:t>Second level</a:t>
             </a:r>
           </a:p>
           <a:p>
             <a:pPr lvl="2"/>
             <a:r>
-              <a:rPr lang="en-US" smtClean="0"/>
+              <a:rPr lang="en-US"/>
               <a:t>Third level</a:t>
             </a:r>
           </a:p>
           <a:p>
             <a:pPr lvl="3"/>
             <a:r>
-              <a:rPr lang="en-US" smtClean="0"/>
+              <a:rPr lang="en-US"/>
               <a:t>Fourth level</a:t>
             </a:r>
           </a:p>
           <a:p>
             <a:pPr lvl="4"/>
             <a:r>
-              <a:rPr lang="en-US" smtClean="0"/>
+              <a:rPr lang="en-US"/>
               <a:t>Fifth level</a:t>
             </a:r>
-            <a:endParaRPr lang="en-US"/>
           </a:p>
         </p:txBody>
       </p:sp>
@@ -1191,38 +1181,37 @@
           <a:p>
             <a:pPr lvl="0"/>
             <a:r>
-              <a:rPr lang="en-US" smtClean="0"/>
+              <a:rPr lang="en-US"/>
               <a:t>Edit Master text styles</a:t>
             </a:r>
           </a:p>
           <a:p>
             <a:pPr lvl="1"/>
             <a:r>
-              <a:rPr lang="en-US" smtClean="0"/>
+              <a:rPr lang="en-US"/>
               <a:t>Second level</a:t>
             </a:r>
           </a:p>
           <a:p>
             <a:pPr lvl="2"/>
             <a:r>
-              <a:rPr lang="en-US" smtClean="0"/>
+              <a:rPr lang="en-US"/>
               <a:t>Third level</a:t>
             </a:r>
           </a:p>
           <a:p>
             <a:pPr lvl="3"/>
             <a:r>
-              <a:rPr lang="en-US" smtClean="0"/>
+              <a:rPr lang="en-US"/>
               <a:t>Fourth level</a:t>
             </a:r>
           </a:p>
           <a:p>
             <a:pPr lvl="4"/>
             <a:r>
-              <a:rPr lang="en-US" smtClean="0"/>
+              <a:rPr lang="en-US"/>
               <a:t>Fifth level</a:t>
             </a:r>
-            <a:endParaRPr lang="en-US"/>
           </a:p>
         </p:txBody>
       </p:sp>
@@ -1243,7 +1232,7 @@
           <a:p>
             <a:fld id="{4043B791-FEDF-4108-A8EF-D59F31ED55B2}" type="datetimeFigureOut">
               <a:rPr lang="en-US" smtClean="0"/>
-              <a:t>1/23/2020</a:t>
+              <a:t>9/4/2024</a:t>
             </a:fld>
             <a:endParaRPr lang="en-US"/>
           </a:p>
@@ -1342,10 +1331,9 @@
           <a:lstStyle/>
           <a:p>
             <a:r>
-              <a:rPr lang="en-US" smtClean="0"/>
+              <a:rPr lang="en-US"/>
               <a:t>Click to edit Master title style</a:t>
             </a:r>
-            <a:endParaRPr lang="en-US"/>
           </a:p>
         </p:txBody>
       </p:sp>
@@ -1408,7 +1396,7 @@
           <a:p>
             <a:pPr lvl="0"/>
             <a:r>
-              <a:rPr lang="en-US" smtClean="0"/>
+              <a:rPr lang="en-US"/>
               <a:t>Edit Master text styles</a:t>
             </a:r>
           </a:p>
@@ -1436,38 +1424,37 @@
           <a:p>
             <a:pPr lvl="0"/>
             <a:r>
-              <a:rPr lang="en-US" smtClean="0"/>
+              <a:rPr lang="en-US"/>
               <a:t>Edit Master text styles</a:t>
             </a:r>
           </a:p>
           <a:p>
             <a:pPr lvl="1"/>
             <a:r>
-              <a:rPr lang="en-US" smtClean="0"/>
+              <a:rPr lang="en-US"/>
               <a:t>Second level</a:t>
             </a:r>
           </a:p>
           <a:p>
             <a:pPr lvl="2"/>
             <a:r>
-              <a:rPr lang="en-US" smtClean="0"/>
+              <a:rPr lang="en-US"/>
               <a:t>Third level</a:t>
             </a:r>
           </a:p>
           <a:p>
             <a:pPr lvl="3"/>
             <a:r>
-              <a:rPr lang="en-US" smtClean="0"/>
+              <a:rPr lang="en-US"/>
               <a:t>Fourth level</a:t>
             </a:r>
           </a:p>
           <a:p>
             <a:pPr lvl="4"/>
             <a:r>
-              <a:rPr lang="en-US" smtClean="0"/>
+              <a:rPr lang="en-US"/>
               <a:t>Fifth level</a:t>
             </a:r>
-            <a:endParaRPr lang="en-US"/>
           </a:p>
         </p:txBody>
       </p:sp>
@@ -1530,7 +1517,7 @@
           <a:p>
             <a:pPr lvl="0"/>
             <a:r>
-              <a:rPr lang="en-US" smtClean="0"/>
+              <a:rPr lang="en-US"/>
               <a:t>Edit Master text styles</a:t>
             </a:r>
           </a:p>
@@ -1558,38 +1545,37 @@
           <a:p>
             <a:pPr lvl="0"/>
             <a:r>
-              <a:rPr lang="en-US" smtClean="0"/>
+              <a:rPr lang="en-US"/>
               <a:t>Edit Master text styles</a:t>
             </a:r>
           </a:p>
           <a:p>
             <a:pPr lvl="1"/>
             <a:r>
-              <a:rPr lang="en-US" smtClean="0"/>
+              <a:rPr lang="en-US"/>
               <a:t>Second level</a:t>
             </a:r>
           </a:p>
           <a:p>
             <a:pPr lvl="2"/>
             <a:r>
-              <a:rPr lang="en-US" smtClean="0"/>
+              <a:rPr lang="en-US"/>
               <a:t>Third level</a:t>
             </a:r>
           </a:p>
           <a:p>
             <a:pPr lvl="3"/>
             <a:r>
-              <a:rPr lang="en-US" smtClean="0"/>
+              <a:rPr lang="en-US"/>
               <a:t>Fourth level</a:t>
             </a:r>
           </a:p>
           <a:p>
             <a:pPr lvl="4"/>
             <a:r>
-              <a:rPr lang="en-US" smtClean="0"/>
+              <a:rPr lang="en-US"/>
               <a:t>Fifth level</a:t>
             </a:r>
-            <a:endParaRPr lang="en-US"/>
           </a:p>
         </p:txBody>
       </p:sp>
@@ -1610,7 +1596,7 @@
           <a:p>
             <a:fld id="{4043B791-FEDF-4108-A8EF-D59F31ED55B2}" type="datetimeFigureOut">
               <a:rPr lang="en-US" smtClean="0"/>
-              <a:t>1/23/2020</a:t>
+              <a:t>9/4/2024</a:t>
             </a:fld>
             <a:endParaRPr lang="en-US"/>
           </a:p>
@@ -1704,10 +1690,9 @@
           <a:lstStyle/>
           <a:p>
             <a:r>
-              <a:rPr lang="en-US" smtClean="0"/>
+              <a:rPr lang="en-US"/>
               <a:t>Click to edit Master title style</a:t>
             </a:r>
-            <a:endParaRPr lang="en-US"/>
           </a:p>
         </p:txBody>
       </p:sp>
@@ -1728,7 +1713,7 @@
           <a:p>
             <a:fld id="{4043B791-FEDF-4108-A8EF-D59F31ED55B2}" type="datetimeFigureOut">
               <a:rPr lang="en-US" smtClean="0"/>
-              <a:t>1/23/2020</a:t>
+              <a:t>9/4/2024</a:t>
             </a:fld>
             <a:endParaRPr lang="en-US"/>
           </a:p>
@@ -1823,7 +1808,7 @@
           <a:p>
             <a:fld id="{4043B791-FEDF-4108-A8EF-D59F31ED55B2}" type="datetimeFigureOut">
               <a:rPr lang="en-US" smtClean="0"/>
-              <a:t>1/23/2020</a:t>
+              <a:t>9/4/2024</a:t>
             </a:fld>
             <a:endParaRPr lang="en-US"/>
           </a:p>
@@ -1926,10 +1911,9 @@
           </a:lstStyle>
           <a:p>
             <a:r>
-              <a:rPr lang="en-US" smtClean="0"/>
+              <a:rPr lang="en-US"/>
               <a:t>Click to edit Master title style</a:t>
             </a:r>
-            <a:endParaRPr lang="en-US"/>
           </a:p>
         </p:txBody>
       </p:sp>
@@ -1983,38 +1967,37 @@
           <a:p>
             <a:pPr lvl="0"/>
             <a:r>
-              <a:rPr lang="en-US" smtClean="0"/>
+              <a:rPr lang="en-US"/>
               <a:t>Edit Master text styles</a:t>
             </a:r>
           </a:p>
           <a:p>
             <a:pPr lvl="1"/>
             <a:r>
-              <a:rPr lang="en-US" smtClean="0"/>
+              <a:rPr lang="en-US"/>
               <a:t>Second level</a:t>
             </a:r>
           </a:p>
           <a:p>
             <a:pPr lvl="2"/>
             <a:r>
-              <a:rPr lang="en-US" smtClean="0"/>
+              <a:rPr lang="en-US"/>
               <a:t>Third level</a:t>
             </a:r>
           </a:p>
           <a:p>
             <a:pPr lvl="3"/>
             <a:r>
-              <a:rPr lang="en-US" smtClean="0"/>
+              <a:rPr lang="en-US"/>
               <a:t>Fourth level</a:t>
             </a:r>
           </a:p>
           <a:p>
             <a:pPr lvl="4"/>
             <a:r>
-              <a:rPr lang="en-US" smtClean="0"/>
+              <a:rPr lang="en-US"/>
               <a:t>Fifth level</a:t>
             </a:r>
-            <a:endParaRPr lang="en-US"/>
           </a:p>
         </p:txBody>
       </p:sp>
@@ -2077,7 +2060,7 @@
           <a:p>
             <a:pPr lvl="0"/>
             <a:r>
-              <a:rPr lang="en-US" smtClean="0"/>
+              <a:rPr lang="en-US"/>
               <a:t>Edit Master text styles</a:t>
             </a:r>
           </a:p>
@@ -2100,7 +2083,7 @@
           <a:p>
             <a:fld id="{4043B791-FEDF-4108-A8EF-D59F31ED55B2}" type="datetimeFigureOut">
               <a:rPr lang="en-US" smtClean="0"/>
-              <a:t>1/23/2020</a:t>
+              <a:t>9/4/2024</a:t>
             </a:fld>
             <a:endParaRPr lang="en-US"/>
           </a:p>
@@ -2203,10 +2186,9 @@
           </a:lstStyle>
           <a:p>
             <a:r>
-              <a:rPr lang="en-US" smtClean="0"/>
+              <a:rPr lang="en-US"/>
               <a:t>Click to edit Master title style</a:t>
             </a:r>
-            <a:endParaRPr lang="en-US"/>
           </a:p>
         </p:txBody>
       </p:sp>
@@ -2330,7 +2312,7 @@
           <a:p>
             <a:pPr lvl="0"/>
             <a:r>
-              <a:rPr lang="en-US" smtClean="0"/>
+              <a:rPr lang="en-US"/>
               <a:t>Edit Master text styles</a:t>
             </a:r>
           </a:p>
@@ -2353,7 +2335,7 @@
           <a:p>
             <a:fld id="{4043B791-FEDF-4108-A8EF-D59F31ED55B2}" type="datetimeFigureOut">
               <a:rPr lang="en-US" smtClean="0"/>
-              <a:t>1/23/2020</a:t>
+              <a:t>9/4/2024</a:t>
             </a:fld>
             <a:endParaRPr lang="en-US"/>
           </a:p>
@@ -2462,10 +2444,9 @@
           <a:lstStyle/>
           <a:p>
             <a:r>
-              <a:rPr lang="en-US" smtClean="0"/>
+              <a:rPr lang="en-US"/>
               <a:t>Click to edit Master title style</a:t>
             </a:r>
-            <a:endParaRPr lang="en-US"/>
           </a:p>
         </p:txBody>
       </p:sp>
@@ -2496,38 +2477,37 @@
           <a:p>
             <a:pPr lvl="0"/>
             <a:r>
-              <a:rPr lang="en-US" smtClean="0"/>
+              <a:rPr lang="en-US"/>
               <a:t>Edit Master text styles</a:t>
             </a:r>
           </a:p>
           <a:p>
             <a:pPr lvl="1"/>
             <a:r>
-              <a:rPr lang="en-US" smtClean="0"/>
+              <a:rPr lang="en-US"/>
               <a:t>Second level</a:t>
             </a:r>
           </a:p>
           <a:p>
             <a:pPr lvl="2"/>
             <a:r>
-              <a:rPr lang="en-US" smtClean="0"/>
+              <a:rPr lang="en-US"/>
               <a:t>Third level</a:t>
             </a:r>
           </a:p>
           <a:p>
             <a:pPr lvl="3"/>
             <a:r>
-              <a:rPr lang="en-US" smtClean="0"/>
+              <a:rPr lang="en-US"/>
               <a:t>Fourth level</a:t>
             </a:r>
           </a:p>
           <a:p>
             <a:pPr lvl="4"/>
             <a:r>
-              <a:rPr lang="en-US" smtClean="0"/>
+              <a:rPr lang="en-US"/>
               <a:t>Fifth level</a:t>
             </a:r>
-            <a:endParaRPr lang="en-US"/>
           </a:p>
         </p:txBody>
       </p:sp>
@@ -2566,7 +2546,7 @@
           <a:p>
             <a:fld id="{4043B791-FEDF-4108-A8EF-D59F31ED55B2}" type="datetimeFigureOut">
               <a:rPr lang="en-US" smtClean="0"/>
-              <a:t>1/23/2020</a:t>
+              <a:t>9/4/2024</a:t>
             </a:fld>
             <a:endParaRPr lang="en-US"/>
           </a:p>
@@ -3102,6 +3082,489 @@
       </p:grpSpPr>
       <p:pic>
         <p:nvPicPr>
+          <p:cNvPr id="5" name="Picture 4" descr="A hexagon with a black background&#10;&#10;Description automatically generated">
+            <a:extLst>
+              <a:ext uri="{FF2B5EF4-FFF2-40B4-BE49-F238E27FC236}">
+                <a16:creationId xmlns:a16="http://schemas.microsoft.com/office/drawing/2014/main" id="{932B5AAA-BBFD-4846-A9E1-0849103F5A9C}"/>
+              </a:ext>
+            </a:extLst>
+          </p:cNvPr>
+          <p:cNvPicPr>
+            <a:picLocks noChangeAspect="1"/>
+          </p:cNvPicPr>
+          <p:nvPr/>
+        </p:nvPicPr>
+        <p:blipFill>
+          <a:blip r:embed="rId2">
+            <a:extLst>
+              <a:ext uri="{28A0092B-C50C-407E-A947-70E740481C1C}">
+                <a14:useLocalDpi xmlns:a14="http://schemas.microsoft.com/office/drawing/2010/main" val="0"/>
+              </a:ext>
+            </a:extLst>
+          </a:blip>
+          <a:stretch>
+            <a:fillRect/>
+          </a:stretch>
+        </p:blipFill>
+        <p:spPr>
+          <a:xfrm>
+            <a:off x="2856006" y="203903"/>
+            <a:ext cx="5568666" cy="6450194"/>
+          </a:xfrm>
+          <a:prstGeom prst="rect">
+            <a:avLst/>
+          </a:prstGeom>
+        </p:spPr>
+      </p:pic>
+      <p:pic>
+        <p:nvPicPr>
+          <p:cNvPr id="10" name="Picture 4" descr="Image result for r">
+            <a:extLst>
+              <a:ext uri="{FF2B5EF4-FFF2-40B4-BE49-F238E27FC236}">
+                <a16:creationId xmlns:a16="http://schemas.microsoft.com/office/drawing/2014/main" id="{17D9F5D2-E2C1-8430-8A5F-61C1A85FC239}"/>
+              </a:ext>
+            </a:extLst>
+          </p:cNvPr>
+          <p:cNvPicPr>
+            <a:picLocks noChangeAspect="1" noChangeArrowheads="1"/>
+          </p:cNvPicPr>
+          <p:nvPr/>
+        </p:nvPicPr>
+        <p:blipFill>
+          <a:blip r:embed="rId3" cstate="print">
+            <a:extLst>
+              <a:ext uri="{28A0092B-C50C-407E-A947-70E740481C1C}">
+                <a14:useLocalDpi xmlns:a14="http://schemas.microsoft.com/office/drawing/2010/main" val="0"/>
+              </a:ext>
+            </a:extLst>
+          </a:blip>
+          <a:srcRect/>
+          <a:stretch>
+            <a:fillRect/>
+          </a:stretch>
+        </p:blipFill>
+        <p:spPr bwMode="auto">
+          <a:xfrm>
+            <a:off x="6752547" y="1719959"/>
+            <a:ext cx="1384157" cy="1461949"/>
+          </a:xfrm>
+          <a:prstGeom prst="rect">
+            <a:avLst/>
+          </a:prstGeom>
+          <a:noFill/>
+          <a:extLst>
+            <a:ext uri="{909E8E84-426E-40DD-AFC4-6F175D3DCCD1}">
+              <a14:hiddenFill xmlns:a14="http://schemas.microsoft.com/office/drawing/2010/main">
+                <a:solidFill>
+                  <a:srgbClr val="FFFFFF"/>
+                </a:solidFill>
+              </a14:hiddenFill>
+            </a:ext>
+          </a:extLst>
+        </p:spPr>
+      </p:pic>
+      <p:pic>
+        <p:nvPicPr>
+          <p:cNvPr id="11" name="Picture 6" descr="Image result for r">
+            <a:extLst>
+              <a:ext uri="{FF2B5EF4-FFF2-40B4-BE49-F238E27FC236}">
+                <a16:creationId xmlns:a16="http://schemas.microsoft.com/office/drawing/2014/main" id="{0FDACFB4-DD27-3C31-28AC-121D5040A5D0}"/>
+              </a:ext>
+            </a:extLst>
+          </p:cNvPr>
+          <p:cNvPicPr>
+            <a:picLocks noChangeAspect="1" noChangeArrowheads="1"/>
+          </p:cNvPicPr>
+          <p:nvPr/>
+        </p:nvPicPr>
+        <p:blipFill>
+          <a:blip r:embed="rId4" cstate="print">
+            <a:lum bright="70000" contrast="-70000"/>
+            <a:extLst>
+              <a:ext uri="{28A0092B-C50C-407E-A947-70E740481C1C}">
+                <a14:useLocalDpi xmlns:a14="http://schemas.microsoft.com/office/drawing/2010/main" val="0"/>
+              </a:ext>
+            </a:extLst>
+          </a:blip>
+          <a:srcRect/>
+          <a:stretch>
+            <a:fillRect/>
+          </a:stretch>
+        </p:blipFill>
+        <p:spPr bwMode="auto">
+          <a:xfrm>
+            <a:off x="3202997" y="2709113"/>
+            <a:ext cx="719887" cy="719887"/>
+          </a:xfrm>
+          <a:prstGeom prst="rect">
+            <a:avLst/>
+          </a:prstGeom>
+          <a:noFill/>
+          <a:extLst>
+            <a:ext uri="{909E8E84-426E-40DD-AFC4-6F175D3DCCD1}">
+              <a14:hiddenFill xmlns:a14="http://schemas.microsoft.com/office/drawing/2010/main">
+                <a:solidFill>
+                  <a:srgbClr val="FFFFFF"/>
+                </a:solidFill>
+              </a14:hiddenFill>
+            </a:ext>
+          </a:extLst>
+        </p:spPr>
+      </p:pic>
+      <p:pic>
+        <p:nvPicPr>
+          <p:cNvPr id="12" name="Picture 8" descr="Image result for r">
+            <a:extLst>
+              <a:ext uri="{FF2B5EF4-FFF2-40B4-BE49-F238E27FC236}">
+                <a16:creationId xmlns:a16="http://schemas.microsoft.com/office/drawing/2014/main" id="{F9E96711-2833-3B75-B693-985089FE1A51}"/>
+              </a:ext>
+            </a:extLst>
+          </p:cNvPr>
+          <p:cNvPicPr>
+            <a:picLocks noChangeAspect="1" noChangeArrowheads="1"/>
+          </p:cNvPicPr>
+          <p:nvPr/>
+        </p:nvPicPr>
+        <p:blipFill>
+          <a:blip r:embed="rId5" cstate="print">
+            <a:extLst>
+              <a:ext uri="{28A0092B-C50C-407E-A947-70E740481C1C}">
+                <a14:useLocalDpi xmlns:a14="http://schemas.microsoft.com/office/drawing/2010/main" val="0"/>
+              </a:ext>
+            </a:extLst>
+          </a:blip>
+          <a:srcRect/>
+          <a:stretch>
+            <a:fillRect/>
+          </a:stretch>
+        </p:blipFill>
+        <p:spPr bwMode="auto">
+          <a:xfrm>
+            <a:off x="5095936" y="4873548"/>
+            <a:ext cx="1034395" cy="1076154"/>
+          </a:xfrm>
+          <a:prstGeom prst="rect">
+            <a:avLst/>
+          </a:prstGeom>
+          <a:noFill/>
+          <a:extLst>
+            <a:ext uri="{909E8E84-426E-40DD-AFC4-6F175D3DCCD1}">
+              <a14:hiddenFill xmlns:a14="http://schemas.microsoft.com/office/drawing/2010/main">
+                <a:solidFill>
+                  <a:srgbClr val="FFFFFF"/>
+                </a:solidFill>
+              </a14:hiddenFill>
+            </a:ext>
+          </a:extLst>
+        </p:spPr>
+      </p:pic>
+      <p:pic>
+        <p:nvPicPr>
+          <p:cNvPr id="13" name="Picture 10" descr="Image result for r">
+            <a:extLst>
+              <a:ext uri="{FF2B5EF4-FFF2-40B4-BE49-F238E27FC236}">
+                <a16:creationId xmlns:a16="http://schemas.microsoft.com/office/drawing/2014/main" id="{7C15CB01-DE77-BFDB-85D4-90AF6EE1541A}"/>
+              </a:ext>
+            </a:extLst>
+          </p:cNvPr>
+          <p:cNvPicPr>
+            <a:picLocks noChangeAspect="1" noChangeArrowheads="1"/>
+          </p:cNvPicPr>
+          <p:nvPr/>
+        </p:nvPicPr>
+        <p:blipFill>
+          <a:blip r:embed="rId6">
+            <a:extLst>
+              <a:ext uri="{28A0092B-C50C-407E-A947-70E740481C1C}">
+                <a14:useLocalDpi xmlns:a14="http://schemas.microsoft.com/office/drawing/2010/main" val="0"/>
+              </a:ext>
+            </a:extLst>
+          </a:blip>
+          <a:srcRect/>
+          <a:stretch>
+            <a:fillRect/>
+          </a:stretch>
+        </p:blipFill>
+        <p:spPr bwMode="auto">
+          <a:xfrm>
+            <a:off x="4662486" y="766441"/>
+            <a:ext cx="1193946" cy="1273213"/>
+          </a:xfrm>
+          <a:prstGeom prst="rect">
+            <a:avLst/>
+          </a:prstGeom>
+          <a:noFill/>
+          <a:extLst>
+            <a:ext uri="{909E8E84-426E-40DD-AFC4-6F175D3DCCD1}">
+              <a14:hiddenFill xmlns:a14="http://schemas.microsoft.com/office/drawing/2010/main">
+                <a:solidFill>
+                  <a:srgbClr val="FFFFFF"/>
+                </a:solidFill>
+              </a14:hiddenFill>
+            </a:ext>
+          </a:extLst>
+        </p:spPr>
+      </p:pic>
+      <p:pic>
+        <p:nvPicPr>
+          <p:cNvPr id="14" name="Picture 12" descr="Image result for r">
+            <a:extLst>
+              <a:ext uri="{FF2B5EF4-FFF2-40B4-BE49-F238E27FC236}">
+                <a16:creationId xmlns:a16="http://schemas.microsoft.com/office/drawing/2014/main" id="{E7B2CA8F-7CF7-0275-4369-CC7D8650AE8C}"/>
+              </a:ext>
+            </a:extLst>
+          </p:cNvPr>
+          <p:cNvPicPr>
+            <a:picLocks noChangeAspect="1" noChangeArrowheads="1"/>
+          </p:cNvPicPr>
+          <p:nvPr/>
+        </p:nvPicPr>
+        <p:blipFill>
+          <a:blip r:embed="rId7" cstate="print">
+            <a:extLst>
+              <a:ext uri="{28A0092B-C50C-407E-A947-70E740481C1C}">
+                <a14:useLocalDpi xmlns:a14="http://schemas.microsoft.com/office/drawing/2010/main" val="0"/>
+              </a:ext>
+            </a:extLst>
+          </a:blip>
+          <a:srcRect/>
+          <a:stretch>
+            <a:fillRect/>
+          </a:stretch>
+        </p:blipFill>
+        <p:spPr bwMode="auto">
+          <a:xfrm>
+            <a:off x="3956034" y="2416142"/>
+            <a:ext cx="2966839" cy="2299300"/>
+          </a:xfrm>
+          <a:prstGeom prst="rect">
+            <a:avLst/>
+          </a:prstGeom>
+          <a:noFill/>
+          <a:extLst>
+            <a:ext uri="{909E8E84-426E-40DD-AFC4-6F175D3DCCD1}">
+              <a14:hiddenFill xmlns:a14="http://schemas.microsoft.com/office/drawing/2010/main">
+                <a:solidFill>
+                  <a:srgbClr val="FFFFFF"/>
+                </a:solidFill>
+              </a14:hiddenFill>
+            </a:ext>
+          </a:extLst>
+        </p:spPr>
+      </p:pic>
+      <p:pic>
+        <p:nvPicPr>
+          <p:cNvPr id="1026" name="Picture 2" descr="Letter r Stickers - Free education Stickers">
+            <a:extLst>
+              <a:ext uri="{FF2B5EF4-FFF2-40B4-BE49-F238E27FC236}">
+                <a16:creationId xmlns:a16="http://schemas.microsoft.com/office/drawing/2014/main" id="{21A5E894-E6AA-170A-251A-63A1443EDC61}"/>
+              </a:ext>
+            </a:extLst>
+          </p:cNvPr>
+          <p:cNvPicPr>
+            <a:picLocks noChangeAspect="1" noChangeArrowheads="1"/>
+          </p:cNvPicPr>
+          <p:nvPr/>
+        </p:nvPicPr>
+        <p:blipFill>
+          <a:blip r:embed="rId8" cstate="print">
+            <a:extLst>
+              <a:ext uri="{28A0092B-C50C-407E-A947-70E740481C1C}">
+                <a14:useLocalDpi xmlns:a14="http://schemas.microsoft.com/office/drawing/2010/main" val="0"/>
+              </a:ext>
+            </a:extLst>
+          </a:blip>
+          <a:srcRect/>
+          <a:stretch>
+            <a:fillRect/>
+          </a:stretch>
+        </p:blipFill>
+        <p:spPr bwMode="auto">
+          <a:xfrm>
+            <a:off x="6051125" y="1151950"/>
+            <a:ext cx="826908" cy="826908"/>
+          </a:xfrm>
+          <a:prstGeom prst="rect">
+            <a:avLst/>
+          </a:prstGeom>
+          <a:noFill/>
+          <a:extLst>
+            <a:ext uri="{909E8E84-426E-40DD-AFC4-6F175D3DCCD1}">
+              <a14:hiddenFill xmlns:a14="http://schemas.microsoft.com/office/drawing/2010/main">
+                <a:solidFill>
+                  <a:srgbClr val="FFFFFF"/>
+                </a:solidFill>
+              </a14:hiddenFill>
+            </a:ext>
+          </a:extLst>
+        </p:spPr>
+      </p:pic>
+      <p:pic>
+        <p:nvPicPr>
+          <p:cNvPr id="15" name="Picture 14">
+            <a:extLst>
+              <a:ext uri="{FF2B5EF4-FFF2-40B4-BE49-F238E27FC236}">
+                <a16:creationId xmlns:a16="http://schemas.microsoft.com/office/drawing/2014/main" id="{98C8D04A-9C40-A001-EB25-9CFFAF52B49D}"/>
+              </a:ext>
+            </a:extLst>
+          </p:cNvPr>
+          <p:cNvPicPr>
+            <a:picLocks noChangeAspect="1"/>
+          </p:cNvPicPr>
+          <p:nvPr/>
+        </p:nvPicPr>
+        <p:blipFill>
+          <a:blip r:embed="rId9"/>
+          <a:stretch>
+            <a:fillRect/>
+          </a:stretch>
+        </p:blipFill>
+        <p:spPr>
+          <a:xfrm>
+            <a:off x="3234454" y="3735891"/>
+            <a:ext cx="1698830" cy="1487805"/>
+          </a:xfrm>
+          <a:prstGeom prst="rect">
+            <a:avLst/>
+          </a:prstGeom>
+        </p:spPr>
+      </p:pic>
+      <p:pic>
+        <p:nvPicPr>
+          <p:cNvPr id="1030" name="Picture 6" descr="R Stickers - Free shapes and symbols Stickers">
+            <a:extLst>
+              <a:ext uri="{FF2B5EF4-FFF2-40B4-BE49-F238E27FC236}">
+                <a16:creationId xmlns:a16="http://schemas.microsoft.com/office/drawing/2014/main" id="{DC6899C7-A19F-AA6A-38B6-16308CA336F7}"/>
+              </a:ext>
+            </a:extLst>
+          </p:cNvPr>
+          <p:cNvPicPr>
+            <a:picLocks noChangeAspect="1" noChangeArrowheads="1"/>
+          </p:cNvPicPr>
+          <p:nvPr/>
+        </p:nvPicPr>
+        <p:blipFill>
+          <a:blip r:embed="rId10" cstate="print">
+            <a:extLst>
+              <a:ext uri="{28A0092B-C50C-407E-A947-70E740481C1C}">
+                <a14:useLocalDpi xmlns:a14="http://schemas.microsoft.com/office/drawing/2010/main" val="0"/>
+              </a:ext>
+            </a:extLst>
+          </a:blip>
+          <a:srcRect/>
+          <a:stretch>
+            <a:fillRect/>
+          </a:stretch>
+        </p:blipFill>
+        <p:spPr bwMode="auto">
+          <a:xfrm>
+            <a:off x="6874592" y="3429000"/>
+            <a:ext cx="1361501" cy="1361501"/>
+          </a:xfrm>
+          <a:prstGeom prst="rect">
+            <a:avLst/>
+          </a:prstGeom>
+          <a:noFill/>
+          <a:extLst>
+            <a:ext uri="{909E8E84-426E-40DD-AFC4-6F175D3DCCD1}">
+              <a14:hiddenFill xmlns:a14="http://schemas.microsoft.com/office/drawing/2010/main">
+                <a:solidFill>
+                  <a:srgbClr val="FFFFFF"/>
+                </a:solidFill>
+              </a14:hiddenFill>
+            </a:ext>
+          </a:extLst>
+        </p:spPr>
+      </p:pic>
+      <p:pic>
+        <p:nvPicPr>
+          <p:cNvPr id="1034" name="Picture 10" descr="R Letter Png Free Download - Small Letter R Design, Transparent Png -  kindpng">
+            <a:extLst>
+              <a:ext uri="{FF2B5EF4-FFF2-40B4-BE49-F238E27FC236}">
+                <a16:creationId xmlns:a16="http://schemas.microsoft.com/office/drawing/2014/main" id="{54578F46-F702-6073-E987-9BA5EF03F221}"/>
+              </a:ext>
+            </a:extLst>
+          </p:cNvPr>
+          <p:cNvPicPr>
+            <a:picLocks noChangeAspect="1" noChangeArrowheads="1"/>
+          </p:cNvPicPr>
+          <p:nvPr/>
+        </p:nvPicPr>
+        <p:blipFill>
+          <a:blip r:embed="rId11">
+            <a:clrChange>
+              <a:clrFrom>
+                <a:srgbClr val="F6F6F6"/>
+              </a:clrFrom>
+              <a:clrTo>
+                <a:srgbClr val="F6F6F6">
+                  <a:alpha val="0"/>
+                </a:srgbClr>
+              </a:clrTo>
+            </a:clrChange>
+            <a:extLst>
+              <a:ext uri="{28A0092B-C50C-407E-A947-70E740481C1C}">
+                <a14:useLocalDpi xmlns:a14="http://schemas.microsoft.com/office/drawing/2010/main" val="0"/>
+              </a:ext>
+            </a:extLst>
+          </a:blip>
+          <a:srcRect/>
+          <a:stretch>
+            <a:fillRect/>
+          </a:stretch>
+        </p:blipFill>
+        <p:spPr bwMode="auto">
+          <a:xfrm>
+            <a:off x="3021007" y="1415762"/>
+            <a:ext cx="1803753" cy="1765912"/>
+          </a:xfrm>
+          <a:prstGeom prst="rect">
+            <a:avLst/>
+          </a:prstGeom>
+          <a:noFill/>
+          <a:extLst>
+            <a:ext uri="{909E8E84-426E-40DD-AFC4-6F175D3DCCD1}">
+              <a14:hiddenFill xmlns:a14="http://schemas.microsoft.com/office/drawing/2010/main">
+                <a:solidFill>
+                  <a:srgbClr val="FFFFFF"/>
+                </a:solidFill>
+              </a14:hiddenFill>
+            </a:ext>
+          </a:extLst>
+        </p:spPr>
+      </p:pic>
+    </p:spTree>
+    <p:extLst>
+      <p:ext uri="{BB962C8B-B14F-4D97-AF65-F5344CB8AC3E}">
+        <p14:creationId xmlns:p14="http://schemas.microsoft.com/office/powerpoint/2010/main" val="637532132"/>
+      </p:ext>
+    </p:extLst>
+  </p:cSld>
+  <p:clrMapOvr>
+    <a:masterClrMapping/>
+  </p:clrMapOvr>
+</p:sld>
+</file>
+
+<file path=ppt/slides/slide3.xml><?xml version="1.0" encoding="utf-8"?>
+<p:sld xmlns:a="http://schemas.openxmlformats.org/drawingml/2006/main" xmlns:r="http://schemas.openxmlformats.org/officeDocument/2006/relationships" xmlns:p="http://schemas.openxmlformats.org/presentationml/2006/main">
+  <p:cSld>
+    <p:spTree>
+      <p:nvGrpSpPr>
+        <p:cNvPr id="1" name=""/>
+        <p:cNvGrpSpPr/>
+        <p:nvPr/>
+      </p:nvGrpSpPr>
+      <p:grpSpPr>
+        <a:xfrm>
+          <a:off x="0" y="0"/>
+          <a:ext cx="0" cy="0"/>
+          <a:chOff x="0" y="0"/>
+          <a:chExt cx="0" cy="0"/>
+        </a:xfrm>
+      </p:grpSpPr>
+      <p:pic>
+        <p:nvPicPr>
           <p:cNvPr id="2050" name="Picture 2" descr="Superman Clipart Free Clipart Images"/>
           <p:cNvPicPr>
             <a:picLocks noChangeAspect="1" noChangeArrowheads="1"/>
@@ -3258,7 +3721,7 @@
 </p:sld>
 </file>
 
-<file path=ppt/slides/slide3.xml><?xml version="1.0" encoding="utf-8"?>
+<file path=ppt/slides/slide4.xml><?xml version="1.0" encoding="utf-8"?>
 <p:sld xmlns:a="http://schemas.openxmlformats.org/drawingml/2006/main" xmlns:r="http://schemas.openxmlformats.org/officeDocument/2006/relationships" xmlns:p="http://schemas.openxmlformats.org/presentationml/2006/main" showMasterSp="0">
   <p:cSld>
     <p:bg>

</xml_diff>